<commit_message>
Update Phone Marketing Decision Model for Retail Banking.pptx
</commit_message>
<xml_diff>
--- a/Phone Marketing Decision Model for Retail Banking.pptx
+++ b/Phone Marketing Decision Model for Retail Banking.pptx
@@ -8644,8 +8644,8 @@
         </p:nvSpPr>
         <p:spPr>
           <a:xfrm>
-            <a:off x="2349722" y="5961277"/>
-            <a:ext cx="13588556" cy="486030"/>
+            <a:off x="2349722" y="5769633"/>
+            <a:ext cx="13588556" cy="998991"/>
           </a:xfrm>
           <a:prstGeom prst="rect">
             <a:avLst/>
@@ -8682,7 +8682,7 @@
                   </a:extLst>
                 </a:hlinkClick>
               </a:rPr>
-              <a:t>https://www.kaggle.com/datasets/henriqueyamahata/bank-marketing</a:t>
+              <a:t>https://github.com/larazefani/Phone-Marketing-Decision-Model-for-Retail-Banking/blob/main/random_forest_tree.pdf</a:t>
             </a:r>
             <a:endParaRPr lang="en-US" sz="2821" spc="-118" dirty="0">
               <a:solidFill>

</xml_diff>